<commit_message>
Added part 1 to the folder as png/jpg files
</commit_message>
<xml_diff>
--- a/PhysicsA1.pptx
+++ b/PhysicsA1.pptx
@@ -5,8 +5,7 @@
     <p:sldMasterId id="2147483648" r:id="rId1"/>
   </p:sldMasterIdLst>
   <p:sldIdLst>
-    <p:sldId id="256" r:id="rId2"/>
-    <p:sldId id="257" r:id="rId3"/>
+    <p:sldId id="257" r:id="rId2"/>
   </p:sldIdLst>
   <p:sldSz cx="12192000" cy="6858000"/>
   <p:notesSz cx="6858000" cy="9144000"/>
@@ -105,6 +104,11 @@
       </a:defRPr>
     </a:lvl9pPr>
   </p:defaultTextStyle>
+  <p:extLst>
+    <p:ext uri="{EFAFB233-063F-42B5-8137-9DF3F51BA10A}">
+      <p15:sldGuideLst xmlns:p15="http://schemas.microsoft.com/office/powerpoint/2012/main"/>
+    </p:ext>
+  </p:extLst>
 </p:presentation>
 </file>
 
@@ -257,7 +261,7 @@
           <a:p>
             <a:fld id="{D0DC3EF6-D675-4129-B615-EC0AD09EB36F}" type="datetimeFigureOut">
               <a:rPr lang="en-CA" smtClean="0"/>
-              <a:t>2020-10-09</a:t>
+              <a:t>2020-10-25</a:t>
             </a:fld>
             <a:endParaRPr lang="en-CA"/>
           </a:p>
@@ -457,7 +461,7 @@
           <a:p>
             <a:fld id="{D0DC3EF6-D675-4129-B615-EC0AD09EB36F}" type="datetimeFigureOut">
               <a:rPr lang="en-CA" smtClean="0"/>
-              <a:t>2020-10-09</a:t>
+              <a:t>2020-10-25</a:t>
             </a:fld>
             <a:endParaRPr lang="en-CA"/>
           </a:p>
@@ -667,7 +671,7 @@
           <a:p>
             <a:fld id="{D0DC3EF6-D675-4129-B615-EC0AD09EB36F}" type="datetimeFigureOut">
               <a:rPr lang="en-CA" smtClean="0"/>
-              <a:t>2020-10-09</a:t>
+              <a:t>2020-10-25</a:t>
             </a:fld>
             <a:endParaRPr lang="en-CA"/>
           </a:p>
@@ -867,7 +871,7 @@
           <a:p>
             <a:fld id="{D0DC3EF6-D675-4129-B615-EC0AD09EB36F}" type="datetimeFigureOut">
               <a:rPr lang="en-CA" smtClean="0"/>
-              <a:t>2020-10-09</a:t>
+              <a:t>2020-10-25</a:t>
             </a:fld>
             <a:endParaRPr lang="en-CA"/>
           </a:p>
@@ -1143,7 +1147,7 @@
           <a:p>
             <a:fld id="{D0DC3EF6-D675-4129-B615-EC0AD09EB36F}" type="datetimeFigureOut">
               <a:rPr lang="en-CA" smtClean="0"/>
-              <a:t>2020-10-09</a:t>
+              <a:t>2020-10-25</a:t>
             </a:fld>
             <a:endParaRPr lang="en-CA"/>
           </a:p>
@@ -1411,7 +1415,7 @@
           <a:p>
             <a:fld id="{D0DC3EF6-D675-4129-B615-EC0AD09EB36F}" type="datetimeFigureOut">
               <a:rPr lang="en-CA" smtClean="0"/>
-              <a:t>2020-10-09</a:t>
+              <a:t>2020-10-25</a:t>
             </a:fld>
             <a:endParaRPr lang="en-CA"/>
           </a:p>
@@ -1826,7 +1830,7 @@
           <a:p>
             <a:fld id="{D0DC3EF6-D675-4129-B615-EC0AD09EB36F}" type="datetimeFigureOut">
               <a:rPr lang="en-CA" smtClean="0"/>
-              <a:t>2020-10-09</a:t>
+              <a:t>2020-10-25</a:t>
             </a:fld>
             <a:endParaRPr lang="en-CA"/>
           </a:p>
@@ -1968,7 +1972,7 @@
           <a:p>
             <a:fld id="{D0DC3EF6-D675-4129-B615-EC0AD09EB36F}" type="datetimeFigureOut">
               <a:rPr lang="en-CA" smtClean="0"/>
-              <a:t>2020-10-09</a:t>
+              <a:t>2020-10-25</a:t>
             </a:fld>
             <a:endParaRPr lang="en-CA"/>
           </a:p>
@@ -2081,7 +2085,7 @@
           <a:p>
             <a:fld id="{D0DC3EF6-D675-4129-B615-EC0AD09EB36F}" type="datetimeFigureOut">
               <a:rPr lang="en-CA" smtClean="0"/>
-              <a:t>2020-10-09</a:t>
+              <a:t>2020-10-25</a:t>
             </a:fld>
             <a:endParaRPr lang="en-CA"/>
           </a:p>
@@ -2394,7 +2398,7 @@
           <a:p>
             <a:fld id="{D0DC3EF6-D675-4129-B615-EC0AD09EB36F}" type="datetimeFigureOut">
               <a:rPr lang="en-CA" smtClean="0"/>
-              <a:t>2020-10-09</a:t>
+              <a:t>2020-10-25</a:t>
             </a:fld>
             <a:endParaRPr lang="en-CA"/>
           </a:p>
@@ -2683,7 +2687,7 @@
           <a:p>
             <a:fld id="{D0DC3EF6-D675-4129-B615-EC0AD09EB36F}" type="datetimeFigureOut">
               <a:rPr lang="en-CA" smtClean="0"/>
-              <a:t>2020-10-09</a:t>
+              <a:t>2020-10-25</a:t>
             </a:fld>
             <a:endParaRPr lang="en-CA"/>
           </a:p>
@@ -2926,7 +2930,7 @@
           <a:p>
             <a:fld id="{D0DC3EF6-D675-4129-B615-EC0AD09EB36F}" type="datetimeFigureOut">
               <a:rPr lang="en-CA" smtClean="0"/>
-              <a:t>2020-10-09</a:t>
+              <a:t>2020-10-25</a:t>
             </a:fld>
             <a:endParaRPr lang="en-CA"/>
           </a:p>
@@ -3348,86 +3352,6 @@
           <p:cNvPr id="2" name="Title 1">
             <a:extLst>
               <a:ext uri="{FF2B5EF4-FFF2-40B4-BE49-F238E27FC236}">
-                <a16:creationId xmlns:a16="http://schemas.microsoft.com/office/drawing/2014/main" id="{128158A5-9880-4623-966E-3ECA9361FE36}"/>
-              </a:ext>
-            </a:extLst>
-          </p:cNvPr>
-          <p:cNvSpPr>
-            <a:spLocks noGrp="1"/>
-          </p:cNvSpPr>
-          <p:nvPr>
-            <p:ph type="ctrTitle"/>
-          </p:nvPr>
-        </p:nvSpPr>
-        <p:spPr/>
-        <p:txBody>
-          <a:bodyPr/>
-          <a:lstStyle/>
-          <a:p>
-            <a:endParaRPr lang="en-CA" dirty="0"/>
-          </a:p>
-        </p:txBody>
-      </p:sp>
-      <p:sp>
-        <p:nvSpPr>
-          <p:cNvPr id="3" name="Subtitle 2">
-            <a:extLst>
-              <a:ext uri="{FF2B5EF4-FFF2-40B4-BE49-F238E27FC236}">
-                <a16:creationId xmlns:a16="http://schemas.microsoft.com/office/drawing/2014/main" id="{87F0E049-FEAE-4842-804B-A14F204377F1}"/>
-              </a:ext>
-            </a:extLst>
-          </p:cNvPr>
-          <p:cNvSpPr>
-            <a:spLocks noGrp="1"/>
-          </p:cNvSpPr>
-          <p:nvPr>
-            <p:ph type="subTitle" idx="1"/>
-          </p:nvPr>
-        </p:nvSpPr>
-        <p:spPr/>
-        <p:txBody>
-          <a:bodyPr/>
-          <a:lstStyle/>
-          <a:p>
-            <a:endParaRPr lang="en-CA"/>
-          </a:p>
-        </p:txBody>
-      </p:sp>
-    </p:spTree>
-    <p:extLst>
-      <p:ext uri="{BB962C8B-B14F-4D97-AF65-F5344CB8AC3E}">
-        <p14:creationId xmlns:p14="http://schemas.microsoft.com/office/powerpoint/2010/main" val="3231313632"/>
-      </p:ext>
-    </p:extLst>
-  </p:cSld>
-  <p:clrMapOvr>
-    <a:masterClrMapping/>
-  </p:clrMapOvr>
-</p:sld>
-</file>
-
-<file path=ppt/slides/slide2.xml><?xml version="1.0" encoding="utf-8"?>
-<p:sld xmlns:a="http://schemas.openxmlformats.org/drawingml/2006/main" xmlns:r="http://schemas.openxmlformats.org/officeDocument/2006/relationships" xmlns:p="http://schemas.openxmlformats.org/presentationml/2006/main">
-  <p:cSld>
-    <p:spTree>
-      <p:nvGrpSpPr>
-        <p:cNvPr id="1" name=""/>
-        <p:cNvGrpSpPr/>
-        <p:nvPr/>
-      </p:nvGrpSpPr>
-      <p:grpSpPr>
-        <a:xfrm>
-          <a:off x="0" y="0"/>
-          <a:ext cx="0" cy="0"/>
-          <a:chOff x="0" y="0"/>
-          <a:chExt cx="0" cy="0"/>
-        </a:xfrm>
-      </p:grpSpPr>
-      <p:sp>
-        <p:nvSpPr>
-          <p:cNvPr id="2" name="Title 1">
-            <a:extLst>
-              <a:ext uri="{FF2B5EF4-FFF2-40B4-BE49-F238E27FC236}">
                 <a16:creationId xmlns:a16="http://schemas.microsoft.com/office/drawing/2014/main" id="{552FEDFA-2DE5-44C6-A670-CBAAB9BA21EA}"/>
               </a:ext>
             </a:extLst>
@@ -3484,7 +3408,7 @@
           <a:p>
             <a:r>
               <a:rPr lang="en-CA" dirty="0"/>
-              <a:t>Make a physics simulation for a ball being thrown with an initial velocity and a given angle </a:t>
+              <a:t>Make a physics simulation for a box going down a ramp, with initial height, friction and being able to customize the ramp</a:t>
             </a:r>
           </a:p>
           <a:p>
@@ -3559,7 +3483,7 @@
         </p:blipFill>
         <p:spPr bwMode="auto">
           <a:xfrm>
-            <a:off x="2139462" y="3497386"/>
+            <a:off x="1714500" y="3563814"/>
             <a:ext cx="3294185" cy="3294185"/>
           </a:xfrm>
           <a:prstGeom prst="rect">
@@ -3606,7 +3530,7 @@
         </p:blipFill>
         <p:spPr bwMode="auto">
           <a:xfrm>
-            <a:off x="6096000" y="3563814"/>
+            <a:off x="6188235" y="3482997"/>
             <a:ext cx="5974425" cy="3360614"/>
           </a:xfrm>
           <a:prstGeom prst="rect">

</xml_diff>